<commit_message>
updated execution workflow picture
</commit_message>
<xml_diff>
--- a/docs/source/developer_resources/RC1_Tasks/media/RC1_workflow.pptx
+++ b/docs/source/developer_resources/RC1_Tasks/media/RC1_workflow.pptx
@@ -104,6 +104,22 @@
       </a:defRPr>
     </a:lvl9pPr>
   </p:defaultTextStyle>
+  <p:extLst>
+    <p:ext uri="{EFAFB233-063F-42B5-8137-9DF3F51BA10A}">
+      <p15:sldGuideLst xmlns:p15="http://schemas.microsoft.com/office/powerpoint/2012/main">
+        <p15:guide id="1" orient="horz" pos="2160">
+          <p15:clr>
+            <a:srgbClr val="A4A3A4"/>
+          </p15:clr>
+        </p15:guide>
+        <p15:guide id="2" pos="2880">
+          <p15:clr>
+            <a:srgbClr val="A4A3A4"/>
+          </p15:clr>
+        </p15:guide>
+      </p15:sldGuideLst>
+    </p:ext>
+  </p:extLst>
 </p:presentation>
 </file>
 
@@ -876,10 +892,9 @@
         <a:lstStyle/>
         <a:p>
           <a:r>
-            <a:rPr lang="en-US" dirty="0" smtClean="0"/>
+            <a:rPr lang="en-US" dirty="0"/>
             <a:t>Process Manager</a:t>
           </a:r>
-          <a:endParaRPr lang="en-US" dirty="0"/>
         </a:p>
       </dgm:t>
     </dgm:pt>
@@ -920,17 +935,16 @@
         <a:lstStyle/>
         <a:p>
           <a:r>
-            <a:rPr lang="en-US" dirty="0" smtClean="0"/>
+            <a:rPr lang="en-US" dirty="0"/>
             <a:t>Configuration</a:t>
           </a:r>
           <a:br>
-            <a:rPr lang="en-US" dirty="0" smtClean="0"/>
+            <a:rPr lang="en-US" dirty="0"/>
           </a:br>
           <a:r>
-            <a:rPr lang="en-US" dirty="0" smtClean="0"/>
+            <a:rPr lang="en-US" dirty="0"/>
             <a:t>Manager</a:t>
           </a:r>
-          <a:endParaRPr lang="en-US" dirty="0"/>
         </a:p>
       </dgm:t>
     </dgm:pt>
@@ -972,17 +986,16 @@
         <a:lstStyle/>
         <a:p>
           <a:r>
-            <a:rPr lang="en-US" dirty="0" smtClean="0"/>
+            <a:rPr lang="en-US" dirty="0"/>
             <a:t>Simulation</a:t>
           </a:r>
           <a:br>
-            <a:rPr lang="en-US" dirty="0" smtClean="0"/>
+            <a:rPr lang="en-US" dirty="0"/>
           </a:br>
           <a:r>
-            <a:rPr lang="en-US" dirty="0" smtClean="0"/>
+            <a:rPr lang="en-US" dirty="0"/>
             <a:t>Manager</a:t>
           </a:r>
-          <a:endParaRPr lang="en-US" dirty="0"/>
         </a:p>
       </dgm:t>
     </dgm:pt>
@@ -1023,17 +1036,16 @@
         <a:lstStyle/>
         <a:p>
           <a:r>
-            <a:rPr lang="en-US" dirty="0" smtClean="0"/>
+            <a:rPr lang="en-US" dirty="0"/>
             <a:t>Data </a:t>
           </a:r>
           <a:br>
-            <a:rPr lang="en-US" dirty="0" smtClean="0"/>
+            <a:rPr lang="en-US" dirty="0"/>
           </a:br>
           <a:r>
-            <a:rPr lang="en-US" dirty="0" smtClean="0"/>
+            <a:rPr lang="en-US" dirty="0"/>
             <a:t>Manager</a:t>
           </a:r>
-          <a:endParaRPr lang="en-US" dirty="0"/>
         </a:p>
       </dgm:t>
     </dgm:pt>
@@ -1075,10 +1087,9 @@
         <a:lstStyle/>
         <a:p>
           <a:r>
-            <a:rPr lang="en-US" dirty="0" smtClean="0"/>
+            <a:rPr lang="en-US" dirty="0"/>
             <a:t>FNCS Bridge</a:t>
           </a:r>
-          <a:endParaRPr lang="en-US" dirty="0"/>
         </a:p>
       </dgm:t>
     </dgm:pt>
@@ -1120,25 +1131,24 @@
         <a:lstStyle/>
         <a:p>
           <a:r>
-            <a:rPr lang="en-US" sz="1000" dirty="0" smtClean="0"/>
+            <a:rPr lang="en-US" sz="1000" dirty="0"/>
             <a:t>Simulator</a:t>
           </a:r>
           <a:br>
-            <a:rPr lang="en-US" sz="1000" dirty="0" smtClean="0"/>
+            <a:rPr lang="en-US" sz="1000" dirty="0"/>
           </a:br>
           <a:r>
-            <a:rPr lang="en-US" sz="900" dirty="0" smtClean="0"/>
+            <a:rPr lang="en-US" sz="900" dirty="0"/>
             <a:t>(</a:t>
           </a:r>
           <a:r>
-            <a:rPr lang="en-US" sz="900" dirty="0" err="1" smtClean="0"/>
+            <a:rPr lang="en-US" sz="900" dirty="0" err="1"/>
             <a:t>GridLAB</a:t>
           </a:r>
           <a:r>
-            <a:rPr lang="en-US" sz="900" dirty="0" smtClean="0"/>
+            <a:rPr lang="en-US" sz="900" dirty="0"/>
             <a:t>-D)</a:t>
           </a:r>
-          <a:endParaRPr lang="en-US" sz="900" dirty="0"/>
         </a:p>
       </dgm:t>
     </dgm:pt>
@@ -1180,10 +1190,9 @@
         <a:lstStyle/>
         <a:p>
           <a:r>
-            <a:rPr lang="en-US" dirty="0" smtClean="0"/>
+            <a:rPr lang="en-US" dirty="0"/>
             <a:t>Client sends  Simulation Request</a:t>
           </a:r>
-          <a:endParaRPr lang="en-US" dirty="0"/>
         </a:p>
       </dgm:t>
     </dgm:pt>
@@ -1217,14 +1226,14 @@
         <a:lstStyle/>
         <a:p>
           <a:r>
-            <a:rPr lang="en-US" dirty="0" smtClean="0"/>
+            <a:rPr lang="en-US" dirty="0"/>
             <a:t>Visualization</a:t>
           </a:r>
           <a:br>
-            <a:rPr lang="en-US" dirty="0" smtClean="0"/>
+            <a:rPr lang="en-US" dirty="0"/>
           </a:br>
           <a:r>
-            <a:rPr lang="en-US" dirty="0" smtClean="0"/>
+            <a:rPr lang="en-US" dirty="0"/>
             <a:t>Application</a:t>
           </a:r>
         </a:p>
@@ -1268,21 +1277,16 @@
         <a:lstStyle/>
         <a:p>
           <a:r>
-            <a:rPr lang="en-US" dirty="0" err="1" smtClean="0"/>
+            <a:rPr lang="en-US" dirty="0" err="1"/>
             <a:t>VoltVar</a:t>
           </a:r>
-          <a:r>
-            <a:rPr lang="en-US" dirty="0" smtClean="0"/>
-            <a:t/>
-          </a:r>
           <a:br>
-            <a:rPr lang="en-US" dirty="0" smtClean="0"/>
+            <a:rPr lang="en-US" dirty="0"/>
           </a:br>
           <a:r>
-            <a:rPr lang="en-US" dirty="0" smtClean="0"/>
+            <a:rPr lang="en-US" dirty="0"/>
             <a:t>Application</a:t>
           </a:r>
-          <a:endParaRPr lang="en-US" dirty="0"/>
         </a:p>
       </dgm:t>
     </dgm:pt>
@@ -1339,13 +1343,6 @@
         </dgm:presLayoutVars>
       </dgm:prSet>
       <dgm:spPr/>
-      <dgm:t>
-        <a:bodyPr/>
-        <a:lstStyle/>
-        <a:p>
-          <a:endParaRPr lang="en-US"/>
-        </a:p>
-      </dgm:t>
     </dgm:pt>
     <dgm:pt modelId="{7EBCC1CA-C360-4585-9985-C7299F950D9B}" type="pres">
       <dgm:prSet presAssocID="{C0BA02C4-B447-4A80-97FF-A6B3DEE8BBC3}" presName="level2hierChild" presStyleCnt="0"/>
@@ -1394,13 +1391,6 @@
         </dgm:presLayoutVars>
       </dgm:prSet>
       <dgm:spPr/>
-      <dgm:t>
-        <a:bodyPr/>
-        <a:lstStyle/>
-        <a:p>
-          <a:endParaRPr lang="en-US"/>
-        </a:p>
-      </dgm:t>
     </dgm:pt>
     <dgm:pt modelId="{A21C82FC-8DB3-4F49-8501-C7D64AA6AB1A}" type="pres">
       <dgm:prSet presAssocID="{738CA844-DAE2-476D-990B-BD8B5F9C2405}" presName="level3hierChild" presStyleCnt="0"/>
@@ -1425,13 +1415,6 @@
         </dgm:presLayoutVars>
       </dgm:prSet>
       <dgm:spPr/>
-      <dgm:t>
-        <a:bodyPr/>
-        <a:lstStyle/>
-        <a:p>
-          <a:endParaRPr lang="en-US"/>
-        </a:p>
-      </dgm:t>
     </dgm:pt>
     <dgm:pt modelId="{58D90D2B-5B71-4F27-B658-715CB93563DF}" type="pres">
       <dgm:prSet presAssocID="{118D93F7-3A81-4EBB-A828-20F40234923F}" presName="level3hierChild" presStyleCnt="0"/>
@@ -1456,13 +1439,6 @@
         </dgm:presLayoutVars>
       </dgm:prSet>
       <dgm:spPr/>
-      <dgm:t>
-        <a:bodyPr/>
-        <a:lstStyle/>
-        <a:p>
-          <a:endParaRPr lang="en-US"/>
-        </a:p>
-      </dgm:t>
     </dgm:pt>
     <dgm:pt modelId="{515A3331-AD4F-4CFE-8AB5-B2C8CD600EF2}" type="pres">
       <dgm:prSet presAssocID="{AA76B851-4974-409B-ACA3-60F0EB4ADFA0}" presName="level3hierChild" presStyleCnt="0"/>
@@ -1511,13 +1487,6 @@
         </dgm:presLayoutVars>
       </dgm:prSet>
       <dgm:spPr/>
-      <dgm:t>
-        <a:bodyPr/>
-        <a:lstStyle/>
-        <a:p>
-          <a:endParaRPr lang="en-US"/>
-        </a:p>
-      </dgm:t>
     </dgm:pt>
     <dgm:pt modelId="{F78DD116-54C1-4A3A-B469-81E4DA17A4A1}" type="pres">
       <dgm:prSet presAssocID="{064BD05F-F9EA-41DB-AD86-6BC671ABE2D9}" presName="level3hierChild" presStyleCnt="0"/>
@@ -1536,19 +1505,12 @@
       <dgm:spPr/>
     </dgm:pt>
     <dgm:pt modelId="{FEF938F2-82C8-4506-8572-BD69C465B0A6}" type="pres">
-      <dgm:prSet presAssocID="{1166FD77-FE80-4E17-AB44-C10878C50288}" presName="LevelTwoTextNode" presStyleLbl="node4" presStyleIdx="3" presStyleCnt="5" custScaleX="51822" custScaleY="38050" custLinFactNeighborX="7852" custLinFactNeighborY="52641">
+      <dgm:prSet presAssocID="{1166FD77-FE80-4E17-AB44-C10878C50288}" presName="LevelTwoTextNode" presStyleLbl="node4" presStyleIdx="3" presStyleCnt="5" custScaleX="51822" custScaleY="38050" custLinFactY="3737" custLinFactNeighborX="-2605" custLinFactNeighborY="100000">
         <dgm:presLayoutVars>
           <dgm:chPref val="3"/>
         </dgm:presLayoutVars>
       </dgm:prSet>
       <dgm:spPr/>
-      <dgm:t>
-        <a:bodyPr/>
-        <a:lstStyle/>
-        <a:p>
-          <a:endParaRPr lang="en-US"/>
-        </a:p>
-      </dgm:t>
     </dgm:pt>
     <dgm:pt modelId="{81CC5F3C-28B1-41A0-89B0-B9FA8AA13089}" type="pres">
       <dgm:prSet presAssocID="{1166FD77-FE80-4E17-AB44-C10878C50288}" presName="level3hierChild" presStyleCnt="0"/>
@@ -1567,19 +1529,12 @@
       <dgm:spPr/>
     </dgm:pt>
     <dgm:pt modelId="{6778DCD4-8AED-4F2C-B297-5893C87457B1}" type="pres">
-      <dgm:prSet presAssocID="{05C0F817-B32B-4B74-9CA8-50A44FB1F0E0}" presName="LevelTwoTextNode" presStyleLbl="node4" presStyleIdx="4" presStyleCnt="5" custScaleX="59777" custScaleY="35540" custLinFactNeighborX="-36303" custLinFactNeighborY="95927">
+      <dgm:prSet presAssocID="{05C0F817-B32B-4B74-9CA8-50A44FB1F0E0}" presName="LevelTwoTextNode" presStyleLbl="node4" presStyleIdx="4" presStyleCnt="5" custScaleX="59777" custScaleY="35540" custLinFactY="9492" custLinFactNeighborX="-6281" custLinFactNeighborY="100000">
         <dgm:presLayoutVars>
           <dgm:chPref val="3"/>
         </dgm:presLayoutVars>
       </dgm:prSet>
       <dgm:spPr/>
-      <dgm:t>
-        <a:bodyPr/>
-        <a:lstStyle/>
-        <a:p>
-          <a:endParaRPr lang="en-US"/>
-        </a:p>
-      </dgm:t>
     </dgm:pt>
     <dgm:pt modelId="{CDDFC07F-EC54-4EC6-B356-81E8D76DDDBC}" type="pres">
       <dgm:prSet presAssocID="{05C0F817-B32B-4B74-9CA8-50A44FB1F0E0}" presName="level3hierChild" presStyleCnt="0"/>
@@ -1595,8 +1550,8 @@
     <dgm:cxn modelId="{5B797CF5-4EB2-4103-B1B6-FF82EE07BC58}" type="presOf" srcId="{518EC015-1603-4103-9C1B-BB413E10EA6B}" destId="{A08512BF-D5FF-45E6-AA3F-0323E0140C92}" srcOrd="1" destOrd="0" presId="urn:microsoft.com/office/officeart/2005/8/layout/hierarchy2"/>
     <dgm:cxn modelId="{77DDF4E8-A5AE-4098-A118-7F2E362685A7}" srcId="{720657DA-B37F-4984-8D63-6237F24E7FCC}" destId="{738CA844-DAE2-476D-990B-BD8B5F9C2405}" srcOrd="0" destOrd="0" parTransId="{CC184515-E2BA-45C3-B517-4263AE5CA5A1}" sibTransId="{782CF225-78CA-4508-B317-002BDFB9653A}"/>
     <dgm:cxn modelId="{3578C26F-B3D9-4B57-93BC-5AEDBCE8EE68}" type="presOf" srcId="{1166FD77-FE80-4E17-AB44-C10878C50288}" destId="{FEF938F2-82C8-4506-8572-BD69C465B0A6}" srcOrd="0" destOrd="0" presId="urn:microsoft.com/office/officeart/2005/8/layout/hierarchy2"/>
+    <dgm:cxn modelId="{F0562CA6-2506-43C8-88D0-D9C4215752E3}" type="presOf" srcId="{89C4DF18-6F6D-4D7E-A4AD-B97D3D95E146}" destId="{75437FFD-4671-4705-8F55-FEC706B32262}" srcOrd="1" destOrd="0" presId="urn:microsoft.com/office/officeart/2005/8/layout/hierarchy2"/>
     <dgm:cxn modelId="{D321691F-9B04-4515-905F-785B35FE4DC7}" type="presOf" srcId="{AA76B851-4974-409B-ACA3-60F0EB4ADFA0}" destId="{CC6BCF04-D78C-42F5-9369-A972C96BCE78}" srcOrd="0" destOrd="0" presId="urn:microsoft.com/office/officeart/2005/8/layout/hierarchy2"/>
-    <dgm:cxn modelId="{F0562CA6-2506-43C8-88D0-D9C4215752E3}" type="presOf" srcId="{89C4DF18-6F6D-4D7E-A4AD-B97D3D95E146}" destId="{75437FFD-4671-4705-8F55-FEC706B32262}" srcOrd="1" destOrd="0" presId="urn:microsoft.com/office/officeart/2005/8/layout/hierarchy2"/>
     <dgm:cxn modelId="{B18755AC-C18B-499D-9E0E-811DED63F3AF}" type="presOf" srcId="{738CA844-DAE2-476D-990B-BD8B5F9C2405}" destId="{EE09D4F3-644E-428D-AB85-B01CE4A650CB}" srcOrd="0" destOrd="0" presId="urn:microsoft.com/office/officeart/2005/8/layout/hierarchy2"/>
     <dgm:cxn modelId="{0E1636B8-868A-40E9-8920-160F8D58D403}" srcId="{F8E42183-1CE6-43A2-9362-1CC7FEB50689}" destId="{05C0F817-B32B-4B74-9CA8-50A44FB1F0E0}" srcOrd="2" destOrd="0" parTransId="{56973B96-46FA-4739-9154-40A63AB2B5F0}" sibTransId="{6E4EF234-738F-4294-B650-6642D964C017}"/>
     <dgm:cxn modelId="{144D236B-D162-454F-A2DA-D8206EBB0693}" type="presOf" srcId="{31DE6641-F698-40EA-A186-50135A9061C4}" destId="{FF327164-204F-464F-8576-5EA676DAC342}" srcOrd="1" destOrd="0" presId="urn:microsoft.com/office/officeart/2005/8/layout/hierarchy2"/>
@@ -1666,7 +1621,9 @@
     <dgm:cxn modelId="{2C6172B0-5A77-4AD3-B8C5-719C989CA19E}" type="presParOf" srcId="{3F36915D-1142-4FF8-BD9C-6FC604015296}" destId="{6778DCD4-8AED-4F2C-B297-5893C87457B1}" srcOrd="0" destOrd="0" presId="urn:microsoft.com/office/officeart/2005/8/layout/hierarchy2"/>
     <dgm:cxn modelId="{7397A0BB-BE43-465E-B3F6-2BB49B809106}" type="presParOf" srcId="{3F36915D-1142-4FF8-BD9C-6FC604015296}" destId="{CDDFC07F-EC54-4EC6-B356-81E8D76DDDBC}" srcOrd="1" destOrd="0" presId="urn:microsoft.com/office/officeart/2005/8/layout/hierarchy2"/>
   </dgm:cxnLst>
-  <dgm:bg/>
+  <dgm:bg>
+    <a:noFill/>
+  </dgm:bg>
   <dgm:whole/>
   <dgm:extLst>
     <a:ext uri="http://schemas.microsoft.com/office/drawing/2008/diagram">
@@ -1772,7 +1729,7 @@
         </a:bodyPr>
         <a:lstStyle/>
         <a:p>
-          <a:pPr lvl="0" algn="ctr" defTabSz="355600">
+          <a:pPr marL="0" lvl="0" indent="0" algn="ctr" defTabSz="355600">
             <a:lnSpc>
               <a:spcPct val="90000"/>
             </a:lnSpc>
@@ -1782,12 +1739,12 @@
             <a:spcAft>
               <a:spcPct val="35000"/>
             </a:spcAft>
+            <a:buNone/>
           </a:pPr>
           <a:r>
-            <a:rPr lang="en-US" sz="800" kern="1200" dirty="0" smtClean="0"/>
+            <a:rPr lang="en-US" sz="800" kern="1200" dirty="0"/>
             <a:t>Client sends  Simulation Request</a:t>
           </a:r>
-          <a:endParaRPr lang="en-US" sz="800" kern="1200" dirty="0"/>
         </a:p>
       </dsp:txBody>
       <dsp:txXfrm>
@@ -1850,7 +1807,7 @@
         </a:bodyPr>
         <a:lstStyle/>
         <a:p>
-          <a:pPr lvl="0" algn="ctr" defTabSz="222250">
+          <a:pPr marL="0" lvl="0" indent="0" algn="ctr" defTabSz="222250">
             <a:lnSpc>
               <a:spcPct val="90000"/>
             </a:lnSpc>
@@ -1860,6 +1817,7 @@
             <a:spcAft>
               <a:spcPct val="35000"/>
             </a:spcAft>
+            <a:buNone/>
           </a:pPr>
           <a:endParaRPr lang="en-US" sz="500" kern="1200"/>
         </a:p>
@@ -1957,7 +1915,7 @@
         </a:bodyPr>
         <a:lstStyle/>
         <a:p>
-          <a:pPr lvl="0" algn="ctr" defTabSz="355600">
+          <a:pPr marL="0" lvl="0" indent="0" algn="ctr" defTabSz="355600">
             <a:lnSpc>
               <a:spcPct val="90000"/>
             </a:lnSpc>
@@ -1967,12 +1925,12 @@
             <a:spcAft>
               <a:spcPct val="35000"/>
             </a:spcAft>
+            <a:buNone/>
           </a:pPr>
           <a:r>
-            <a:rPr lang="en-US" sz="800" kern="1200" dirty="0" smtClean="0"/>
+            <a:rPr lang="en-US" sz="800" kern="1200" dirty="0"/>
             <a:t>Process Manager</a:t>
           </a:r>
-          <a:endParaRPr lang="en-US" sz="800" kern="1200" dirty="0"/>
         </a:p>
       </dsp:txBody>
       <dsp:txXfrm>
@@ -2036,7 +1994,7 @@
         </a:bodyPr>
         <a:lstStyle/>
         <a:p>
-          <a:pPr lvl="0" algn="ctr" defTabSz="222250">
+          <a:pPr marL="0" lvl="0" indent="0" algn="ctr" defTabSz="222250">
             <a:lnSpc>
               <a:spcPct val="90000"/>
             </a:lnSpc>
@@ -2046,6 +2004,7 @@
             <a:spcAft>
               <a:spcPct val="35000"/>
             </a:spcAft>
+            <a:buNone/>
           </a:pPr>
           <a:endParaRPr lang="en-US" sz="500" kern="1200"/>
         </a:p>
@@ -2143,7 +2102,7 @@
         </a:bodyPr>
         <a:lstStyle/>
         <a:p>
-          <a:pPr lvl="0" algn="ctr" defTabSz="355600">
+          <a:pPr marL="0" lvl="0" indent="0" algn="ctr" defTabSz="355600">
             <a:lnSpc>
               <a:spcPct val="90000"/>
             </a:lnSpc>
@@ -2153,19 +2112,19 @@
             <a:spcAft>
               <a:spcPct val="35000"/>
             </a:spcAft>
+            <a:buNone/>
           </a:pPr>
           <a:r>
-            <a:rPr lang="en-US" sz="800" kern="1200" dirty="0" smtClean="0"/>
+            <a:rPr lang="en-US" sz="800" kern="1200" dirty="0"/>
             <a:t>Configuration</a:t>
           </a:r>
           <a:br>
-            <a:rPr lang="en-US" sz="800" kern="1200" dirty="0" smtClean="0"/>
+            <a:rPr lang="en-US" sz="800" kern="1200" dirty="0"/>
           </a:br>
           <a:r>
-            <a:rPr lang="en-US" sz="800" kern="1200" dirty="0" smtClean="0"/>
+            <a:rPr lang="en-US" sz="800" kern="1200" dirty="0"/>
             <a:t>Manager</a:t>
           </a:r>
-          <a:endParaRPr lang="en-US" sz="800" kern="1200" dirty="0"/>
         </a:p>
       </dsp:txBody>
       <dsp:txXfrm>
@@ -2229,7 +2188,7 @@
         </a:bodyPr>
         <a:lstStyle/>
         <a:p>
-          <a:pPr lvl="0" algn="ctr" defTabSz="222250">
+          <a:pPr marL="0" lvl="0" indent="0" algn="ctr" defTabSz="222250">
             <a:lnSpc>
               <a:spcPct val="90000"/>
             </a:lnSpc>
@@ -2239,6 +2198,7 @@
             <a:spcAft>
               <a:spcPct val="35000"/>
             </a:spcAft>
+            <a:buNone/>
           </a:pPr>
           <a:endParaRPr lang="en-US" sz="500" kern="1200"/>
         </a:p>
@@ -2336,7 +2296,7 @@
         </a:bodyPr>
         <a:lstStyle/>
         <a:p>
-          <a:pPr lvl="0" algn="ctr" defTabSz="355600">
+          <a:pPr marL="0" lvl="0" indent="0" algn="ctr" defTabSz="355600">
             <a:lnSpc>
               <a:spcPct val="90000"/>
             </a:lnSpc>
@@ -2346,19 +2306,19 @@
             <a:spcAft>
               <a:spcPct val="35000"/>
             </a:spcAft>
+            <a:buNone/>
           </a:pPr>
           <a:r>
-            <a:rPr lang="en-US" sz="800" kern="1200" dirty="0" smtClean="0"/>
+            <a:rPr lang="en-US" sz="800" kern="1200" dirty="0"/>
             <a:t>Data </a:t>
           </a:r>
           <a:br>
-            <a:rPr lang="en-US" sz="800" kern="1200" dirty="0" smtClean="0"/>
+            <a:rPr lang="en-US" sz="800" kern="1200" dirty="0"/>
           </a:br>
           <a:r>
-            <a:rPr lang="en-US" sz="800" kern="1200" dirty="0" smtClean="0"/>
+            <a:rPr lang="en-US" sz="800" kern="1200" dirty="0"/>
             <a:t>Manager</a:t>
           </a:r>
-          <a:endParaRPr lang="en-US" sz="800" kern="1200" dirty="0"/>
         </a:p>
       </dsp:txBody>
       <dsp:txXfrm>
@@ -2421,7 +2381,7 @@
         </a:bodyPr>
         <a:lstStyle/>
         <a:p>
-          <a:pPr lvl="0" algn="ctr" defTabSz="222250">
+          <a:pPr marL="0" lvl="0" indent="0" algn="ctr" defTabSz="222250">
             <a:lnSpc>
               <a:spcPct val="90000"/>
             </a:lnSpc>
@@ -2431,6 +2391,7 @@
             <a:spcAft>
               <a:spcPct val="35000"/>
             </a:spcAft>
+            <a:buNone/>
           </a:pPr>
           <a:endParaRPr lang="en-US" sz="500" kern="1200"/>
         </a:p>
@@ -2528,7 +2489,7 @@
         </a:bodyPr>
         <a:lstStyle/>
         <a:p>
-          <a:pPr lvl="0" algn="ctr" defTabSz="355600">
+          <a:pPr marL="0" lvl="0" indent="0" algn="ctr" defTabSz="355600">
             <a:lnSpc>
               <a:spcPct val="90000"/>
             </a:lnSpc>
@@ -2538,19 +2499,19 @@
             <a:spcAft>
               <a:spcPct val="35000"/>
             </a:spcAft>
+            <a:buNone/>
           </a:pPr>
           <a:r>
-            <a:rPr lang="en-US" sz="800" kern="1200" dirty="0" smtClean="0"/>
+            <a:rPr lang="en-US" sz="800" kern="1200" dirty="0"/>
             <a:t>Simulation</a:t>
           </a:r>
           <a:br>
-            <a:rPr lang="en-US" sz="800" kern="1200" dirty="0" smtClean="0"/>
+            <a:rPr lang="en-US" sz="800" kern="1200" dirty="0"/>
           </a:br>
           <a:r>
-            <a:rPr lang="en-US" sz="800" kern="1200" dirty="0" smtClean="0"/>
+            <a:rPr lang="en-US" sz="800" kern="1200" dirty="0"/>
             <a:t>Manager</a:t>
           </a:r>
-          <a:endParaRPr lang="en-US" sz="800" kern="1200" dirty="0"/>
         </a:p>
       </dsp:txBody>
       <dsp:txXfrm>
@@ -2614,7 +2575,7 @@
         </a:bodyPr>
         <a:lstStyle/>
         <a:p>
-          <a:pPr lvl="0" algn="ctr" defTabSz="222250">
+          <a:pPr marL="0" lvl="0" indent="0" algn="ctr" defTabSz="222250">
             <a:lnSpc>
               <a:spcPct val="90000"/>
             </a:lnSpc>
@@ -2624,6 +2585,7 @@
             <a:spcAft>
               <a:spcPct val="35000"/>
             </a:spcAft>
+            <a:buNone/>
           </a:pPr>
           <a:endParaRPr lang="en-US" sz="500" kern="1200"/>
         </a:p>
@@ -2721,7 +2683,7 @@
         </a:bodyPr>
         <a:lstStyle/>
         <a:p>
-          <a:pPr lvl="0" algn="ctr" defTabSz="355600">
+          <a:pPr marL="0" lvl="0" indent="0" algn="ctr" defTabSz="355600">
             <a:lnSpc>
               <a:spcPct val="90000"/>
             </a:lnSpc>
@@ -2731,12 +2693,12 @@
             <a:spcAft>
               <a:spcPct val="35000"/>
             </a:spcAft>
+            <a:buNone/>
           </a:pPr>
           <a:r>
-            <a:rPr lang="en-US" sz="800" kern="1200" dirty="0" smtClean="0"/>
+            <a:rPr lang="en-US" sz="800" kern="1200" dirty="0"/>
             <a:t>FNCS Bridge</a:t>
           </a:r>
-          <a:endParaRPr lang="en-US" sz="800" kern="1200" dirty="0"/>
         </a:p>
       </dsp:txBody>
       <dsp:txXfrm>
@@ -2800,7 +2762,7 @@
         </a:bodyPr>
         <a:lstStyle/>
         <a:p>
-          <a:pPr lvl="0" algn="ctr" defTabSz="222250">
+          <a:pPr marL="0" lvl="0" indent="0" algn="ctr" defTabSz="222250">
             <a:lnSpc>
               <a:spcPct val="90000"/>
             </a:lnSpc>
@@ -2810,6 +2772,7 @@
             <a:spcAft>
               <a:spcPct val="35000"/>
             </a:spcAft>
+            <a:buNone/>
           </a:pPr>
           <a:endParaRPr lang="en-US" sz="500" kern="1200"/>
         </a:p>
@@ -2907,7 +2870,7 @@
         </a:bodyPr>
         <a:lstStyle/>
         <a:p>
-          <a:pPr lvl="0" algn="ctr" defTabSz="444500">
+          <a:pPr marL="0" lvl="0" indent="0" algn="ctr" defTabSz="444500">
             <a:lnSpc>
               <a:spcPct val="90000"/>
             </a:lnSpc>
@@ -2917,27 +2880,27 @@
             <a:spcAft>
               <a:spcPct val="35000"/>
             </a:spcAft>
+            <a:buNone/>
           </a:pPr>
           <a:r>
-            <a:rPr lang="en-US" sz="1000" kern="1200" dirty="0" smtClean="0"/>
+            <a:rPr lang="en-US" sz="1000" kern="1200" dirty="0"/>
             <a:t>Simulator</a:t>
           </a:r>
           <a:br>
-            <a:rPr lang="en-US" sz="1000" kern="1200" dirty="0" smtClean="0"/>
+            <a:rPr lang="en-US" sz="1000" kern="1200" dirty="0"/>
           </a:br>
           <a:r>
-            <a:rPr lang="en-US" sz="900" kern="1200" dirty="0" smtClean="0"/>
+            <a:rPr lang="en-US" sz="900" kern="1200" dirty="0"/>
             <a:t>(</a:t>
           </a:r>
           <a:r>
-            <a:rPr lang="en-US" sz="900" kern="1200" dirty="0" err="1" smtClean="0"/>
+            <a:rPr lang="en-US" sz="900" kern="1200" dirty="0" err="1"/>
             <a:t>GridLAB</a:t>
           </a:r>
           <a:r>
-            <a:rPr lang="en-US" sz="900" kern="1200" dirty="0" smtClean="0"/>
+            <a:rPr lang="en-US" sz="900" kern="1200" dirty="0"/>
             <a:t>-D)</a:t>
           </a:r>
-          <a:endParaRPr lang="en-US" sz="900" kern="1200" dirty="0"/>
         </a:p>
       </dsp:txBody>
       <dsp:txXfrm>
@@ -2951,9 +2914,9 @@
         <dsp:cNvSpPr/>
       </dsp:nvSpPr>
       <dsp:spPr>
-        <a:xfrm rot="326549">
-          <a:off x="5549667" y="3613575"/>
-          <a:ext cx="1604957" cy="32915"/>
+        <a:xfrm rot="1576818">
+          <a:off x="5473691" y="3878415"/>
+          <a:ext cx="1540108" cy="32915"/>
         </a:xfrm>
         <a:custGeom>
           <a:avLst/>
@@ -2967,7 +2930,7 @@
                 <a:pt x="0" y="16457"/>
               </a:moveTo>
               <a:lnTo>
-                <a:pt x="1604957" y="16457"/>
+                <a:pt x="1540108" y="16457"/>
               </a:lnTo>
             </a:path>
           </a:pathLst>
@@ -3001,7 +2964,7 @@
         </a:bodyPr>
         <a:lstStyle/>
         <a:p>
-          <a:pPr lvl="0" algn="ctr" defTabSz="222250">
+          <a:pPr marL="0" lvl="0" indent="0" algn="ctr" defTabSz="222250">
             <a:lnSpc>
               <a:spcPct val="90000"/>
             </a:lnSpc>
@@ -3011,13 +2974,14 @@
             <a:spcAft>
               <a:spcPct val="35000"/>
             </a:spcAft>
+            <a:buNone/>
           </a:pPr>
           <a:endParaRPr lang="en-US" sz="500" kern="1200"/>
         </a:p>
       </dsp:txBody>
       <dsp:txXfrm>
-        <a:off x="6312022" y="3589909"/>
-        <a:ext cx="80247" cy="80247"/>
+        <a:off x="6205243" y="3856369"/>
+        <a:ext cx="77005" cy="77005"/>
       </dsp:txXfrm>
     </dsp:sp>
     <dsp:sp modelId="{FEF938F2-82C8-4506-8572-BD69C465B0A6}">
@@ -3027,7 +2991,7 @@
       </dsp:nvSpPr>
       <dsp:spPr>
         <a:xfrm>
-          <a:off x="7151007" y="3508926"/>
+          <a:off x="6934206" y="4038604"/>
           <a:ext cx="1074409" cy="394439"/>
         </a:xfrm>
         <a:prstGeom prst="roundRect">
@@ -3108,7 +3072,7 @@
         </a:bodyPr>
         <a:lstStyle/>
         <a:p>
-          <a:pPr lvl="0" algn="ctr" defTabSz="355600">
+          <a:pPr marL="0" lvl="0" indent="0" algn="ctr" defTabSz="355600">
             <a:lnSpc>
               <a:spcPct val="90000"/>
             </a:lnSpc>
@@ -3118,27 +3082,23 @@
             <a:spcAft>
               <a:spcPct val="35000"/>
             </a:spcAft>
+            <a:buNone/>
           </a:pPr>
           <a:r>
-            <a:rPr lang="en-US" sz="800" kern="1200" dirty="0" err="1" smtClean="0"/>
+            <a:rPr lang="en-US" sz="800" kern="1200" dirty="0" err="1"/>
             <a:t>VoltVar</a:t>
           </a:r>
-          <a:r>
-            <a:rPr lang="en-US" sz="800" kern="1200" dirty="0" smtClean="0"/>
-            <a:t/>
-          </a:r>
           <a:br>
-            <a:rPr lang="en-US" sz="800" kern="1200" dirty="0" smtClean="0"/>
+            <a:rPr lang="en-US" sz="800" kern="1200" dirty="0"/>
           </a:br>
           <a:r>
-            <a:rPr lang="en-US" sz="800" kern="1200" dirty="0" smtClean="0"/>
+            <a:rPr lang="en-US" sz="800" kern="1200" dirty="0"/>
             <a:t>Application</a:t>
           </a:r>
-          <a:endParaRPr lang="en-US" sz="800" kern="1200" dirty="0"/>
         </a:p>
       </dsp:txBody>
       <dsp:txXfrm>
-        <a:off x="7162560" y="3520479"/>
+        <a:off x="6945759" y="4050157"/>
         <a:ext cx="1051303" cy="371333"/>
       </dsp:txXfrm>
     </dsp:sp>
@@ -3148,9 +3108,9 @@
         <dsp:cNvSpPr/>
       </dsp:nvSpPr>
       <dsp:spPr>
-        <a:xfrm rot="3543172">
-          <a:off x="5231051" y="4106396"/>
-          <a:ext cx="1326738" cy="32915"/>
+        <a:xfrm rot="2665105">
+          <a:off x="5292295" y="4176706"/>
+          <a:ext cx="1826687" cy="32915"/>
         </a:xfrm>
         <a:custGeom>
           <a:avLst/>
@@ -3164,7 +3124,7 @@
                 <a:pt x="0" y="16457"/>
               </a:moveTo>
               <a:lnTo>
-                <a:pt x="1326738" y="16457"/>
+                <a:pt x="1826687" y="16457"/>
               </a:lnTo>
             </a:path>
           </a:pathLst>
@@ -3198,7 +3158,7 @@
         </a:bodyPr>
         <a:lstStyle/>
         <a:p>
-          <a:pPr lvl="0" algn="ctr" defTabSz="222250">
+          <a:pPr marL="0" lvl="0" indent="0" algn="ctr" defTabSz="266700">
             <a:lnSpc>
               <a:spcPct val="90000"/>
             </a:lnSpc>
@@ -3208,13 +3168,14 @@
             <a:spcAft>
               <a:spcPct val="35000"/>
             </a:spcAft>
+            <a:buNone/>
           </a:pPr>
-          <a:endParaRPr lang="en-US" sz="500" kern="1200"/>
+          <a:endParaRPr lang="en-US" sz="600" kern="1200"/>
         </a:p>
       </dsp:txBody>
       <dsp:txXfrm>
-        <a:off x="5861252" y="4089685"/>
-        <a:ext cx="66336" cy="66336"/>
+        <a:off x="6159971" y="4147496"/>
+        <a:ext cx="91334" cy="91334"/>
       </dsp:txXfrm>
     </dsp:sp>
     <dsp:sp modelId="{6778DCD4-8AED-4F2C-B297-5893C87457B1}">
@@ -3224,7 +3185,7 @@
       </dsp:nvSpPr>
       <dsp:spPr>
         <a:xfrm>
-          <a:off x="6235556" y="4507577"/>
+          <a:off x="6857992" y="4648197"/>
           <a:ext cx="1239337" cy="368419"/>
         </a:xfrm>
         <a:prstGeom prst="roundRect">
@@ -3305,7 +3266,7 @@
         </a:bodyPr>
         <a:lstStyle/>
         <a:p>
-          <a:pPr lvl="0" algn="ctr" defTabSz="355600">
+          <a:pPr marL="0" lvl="0" indent="0" algn="ctr" defTabSz="355600">
             <a:lnSpc>
               <a:spcPct val="90000"/>
             </a:lnSpc>
@@ -3315,22 +3276,23 @@
             <a:spcAft>
               <a:spcPct val="35000"/>
             </a:spcAft>
+            <a:buNone/>
           </a:pPr>
           <a:r>
-            <a:rPr lang="en-US" sz="800" kern="1200" dirty="0" smtClean="0"/>
+            <a:rPr lang="en-US" sz="800" kern="1200" dirty="0"/>
             <a:t>Visualization</a:t>
           </a:r>
           <a:br>
-            <a:rPr lang="en-US" sz="800" kern="1200" dirty="0" smtClean="0"/>
+            <a:rPr lang="en-US" sz="800" kern="1200" dirty="0"/>
           </a:br>
           <a:r>
-            <a:rPr lang="en-US" sz="800" kern="1200" dirty="0" smtClean="0"/>
+            <a:rPr lang="en-US" sz="800" kern="1200" dirty="0"/>
             <a:t>Application</a:t>
           </a:r>
         </a:p>
       </dsp:txBody>
       <dsp:txXfrm>
-        <a:off x="6246347" y="4518368"/>
+        <a:off x="6868783" y="4658988"/>
         <a:ext cx="1217755" cy="346837"/>
       </dsp:txXfrm>
     </dsp:sp>
@@ -4756,10 +4718,9 @@
           <a:lstStyle/>
           <a:p>
             <a:r>
-              <a:rPr lang="en-US" smtClean="0"/>
+              <a:rPr lang="en-US"/>
               <a:t>Click to edit Master title style</a:t>
             </a:r>
-            <a:endParaRPr lang="en-US"/>
           </a:p>
         </p:txBody>
       </p:sp>
@@ -4875,10 +4836,9 @@
           </a:lstStyle>
           <a:p>
             <a:r>
-              <a:rPr lang="en-US" smtClean="0"/>
+              <a:rPr lang="en-US"/>
               <a:t>Click to edit Master subtitle style</a:t>
             </a:r>
-            <a:endParaRPr lang="en-US"/>
           </a:p>
         </p:txBody>
       </p:sp>
@@ -4899,7 +4859,7 @@
           <a:p>
             <a:fld id="{7B56D4AB-5359-46AF-BC0F-B3381E7AC84B}" type="datetimeFigureOut">
               <a:rPr lang="en-US" smtClean="0"/>
-              <a:t>5/16/2017</a:t>
+              <a:t>6/1/2017</a:t>
             </a:fld>
             <a:endParaRPr lang="en-US"/>
           </a:p>
@@ -4993,10 +4953,9 @@
           <a:lstStyle/>
           <a:p>
             <a:r>
-              <a:rPr lang="en-US" smtClean="0"/>
+              <a:rPr lang="en-US"/>
               <a:t>Click to edit Master title style</a:t>
             </a:r>
-            <a:endParaRPr lang="en-US"/>
           </a:p>
         </p:txBody>
       </p:sp>
@@ -5017,38 +4976,37 @@
           <a:p>
             <a:pPr lvl="0"/>
             <a:r>
-              <a:rPr lang="en-US" smtClean="0"/>
+              <a:rPr lang="en-US"/>
               <a:t>Click to edit Master text styles</a:t>
             </a:r>
           </a:p>
           <a:p>
             <a:pPr lvl="1"/>
             <a:r>
-              <a:rPr lang="en-US" smtClean="0"/>
+              <a:rPr lang="en-US"/>
               <a:t>Second level</a:t>
             </a:r>
           </a:p>
           <a:p>
             <a:pPr lvl="2"/>
             <a:r>
-              <a:rPr lang="en-US" smtClean="0"/>
+              <a:rPr lang="en-US"/>
               <a:t>Third level</a:t>
             </a:r>
           </a:p>
           <a:p>
             <a:pPr lvl="3"/>
             <a:r>
-              <a:rPr lang="en-US" smtClean="0"/>
+              <a:rPr lang="en-US"/>
               <a:t>Fourth level</a:t>
             </a:r>
           </a:p>
           <a:p>
             <a:pPr lvl="4"/>
             <a:r>
-              <a:rPr lang="en-US" smtClean="0"/>
+              <a:rPr lang="en-US"/>
               <a:t>Fifth level</a:t>
             </a:r>
-            <a:endParaRPr lang="en-US"/>
           </a:p>
         </p:txBody>
       </p:sp>
@@ -5069,7 +5027,7 @@
           <a:p>
             <a:fld id="{7B56D4AB-5359-46AF-BC0F-B3381E7AC84B}" type="datetimeFigureOut">
               <a:rPr lang="en-US" smtClean="0"/>
-              <a:t>5/16/2017</a:t>
+              <a:t>6/1/2017</a:t>
             </a:fld>
             <a:endParaRPr lang="en-US"/>
           </a:p>
@@ -5168,10 +5126,9 @@
           <a:lstStyle/>
           <a:p>
             <a:r>
-              <a:rPr lang="en-US" smtClean="0"/>
+              <a:rPr lang="en-US"/>
               <a:t>Click to edit Master title style</a:t>
             </a:r>
-            <a:endParaRPr lang="en-US"/>
           </a:p>
         </p:txBody>
       </p:sp>
@@ -5197,38 +5154,37 @@
           <a:p>
             <a:pPr lvl="0"/>
             <a:r>
-              <a:rPr lang="en-US" smtClean="0"/>
+              <a:rPr lang="en-US"/>
               <a:t>Click to edit Master text styles</a:t>
             </a:r>
           </a:p>
           <a:p>
             <a:pPr lvl="1"/>
             <a:r>
-              <a:rPr lang="en-US" smtClean="0"/>
+              <a:rPr lang="en-US"/>
               <a:t>Second level</a:t>
             </a:r>
           </a:p>
           <a:p>
             <a:pPr lvl="2"/>
             <a:r>
-              <a:rPr lang="en-US" smtClean="0"/>
+              <a:rPr lang="en-US"/>
               <a:t>Third level</a:t>
             </a:r>
           </a:p>
           <a:p>
             <a:pPr lvl="3"/>
             <a:r>
-              <a:rPr lang="en-US" smtClean="0"/>
+              <a:rPr lang="en-US"/>
               <a:t>Fourth level</a:t>
             </a:r>
           </a:p>
           <a:p>
             <a:pPr lvl="4"/>
             <a:r>
-              <a:rPr lang="en-US" smtClean="0"/>
+              <a:rPr lang="en-US"/>
               <a:t>Fifth level</a:t>
             </a:r>
-            <a:endParaRPr lang="en-US"/>
           </a:p>
         </p:txBody>
       </p:sp>
@@ -5249,7 +5205,7 @@
           <a:p>
             <a:fld id="{7B56D4AB-5359-46AF-BC0F-B3381E7AC84B}" type="datetimeFigureOut">
               <a:rPr lang="en-US" smtClean="0"/>
-              <a:t>5/16/2017</a:t>
+              <a:t>6/1/2017</a:t>
             </a:fld>
             <a:endParaRPr lang="en-US"/>
           </a:p>
@@ -5343,10 +5299,9 @@
           <a:lstStyle/>
           <a:p>
             <a:r>
-              <a:rPr lang="en-US" smtClean="0"/>
+              <a:rPr lang="en-US"/>
               <a:t>Click to edit Master title style</a:t>
             </a:r>
-            <a:endParaRPr lang="en-US"/>
           </a:p>
         </p:txBody>
       </p:sp>
@@ -5367,38 +5322,37 @@
           <a:p>
             <a:pPr lvl="0"/>
             <a:r>
-              <a:rPr lang="en-US" smtClean="0"/>
+              <a:rPr lang="en-US"/>
               <a:t>Click to edit Master text styles</a:t>
             </a:r>
           </a:p>
           <a:p>
             <a:pPr lvl="1"/>
             <a:r>
-              <a:rPr lang="en-US" smtClean="0"/>
+              <a:rPr lang="en-US"/>
               <a:t>Second level</a:t>
             </a:r>
           </a:p>
           <a:p>
             <a:pPr lvl="2"/>
             <a:r>
-              <a:rPr lang="en-US" smtClean="0"/>
+              <a:rPr lang="en-US"/>
               <a:t>Third level</a:t>
             </a:r>
           </a:p>
           <a:p>
             <a:pPr lvl="3"/>
             <a:r>
-              <a:rPr lang="en-US" smtClean="0"/>
+              <a:rPr lang="en-US"/>
               <a:t>Fourth level</a:t>
             </a:r>
           </a:p>
           <a:p>
             <a:pPr lvl="4"/>
             <a:r>
-              <a:rPr lang="en-US" smtClean="0"/>
+              <a:rPr lang="en-US"/>
               <a:t>Fifth level</a:t>
             </a:r>
-            <a:endParaRPr lang="en-US"/>
           </a:p>
         </p:txBody>
       </p:sp>
@@ -5419,7 +5373,7 @@
           <a:p>
             <a:fld id="{7B56D4AB-5359-46AF-BC0F-B3381E7AC84B}" type="datetimeFigureOut">
               <a:rPr lang="en-US" smtClean="0"/>
-              <a:t>5/16/2017</a:t>
+              <a:t>6/1/2017</a:t>
             </a:fld>
             <a:endParaRPr lang="en-US"/>
           </a:p>
@@ -5522,10 +5476,9 @@
           </a:lstStyle>
           <a:p>
             <a:r>
-              <a:rPr lang="en-US" smtClean="0"/>
+              <a:rPr lang="en-US"/>
               <a:t>Click to edit Master title style</a:t>
             </a:r>
-            <a:endParaRPr lang="en-US"/>
           </a:p>
         </p:txBody>
       </p:sp>
@@ -5642,7 +5595,7 @@
           <a:p>
             <a:pPr lvl="0"/>
             <a:r>
-              <a:rPr lang="en-US" smtClean="0"/>
+              <a:rPr lang="en-US"/>
               <a:t>Click to edit Master text styles</a:t>
             </a:r>
           </a:p>
@@ -5665,7 +5618,7 @@
           <a:p>
             <a:fld id="{7B56D4AB-5359-46AF-BC0F-B3381E7AC84B}" type="datetimeFigureOut">
               <a:rPr lang="en-US" smtClean="0"/>
-              <a:t>5/16/2017</a:t>
+              <a:t>6/1/2017</a:t>
             </a:fld>
             <a:endParaRPr lang="en-US"/>
           </a:p>
@@ -5759,10 +5712,9 @@
           <a:lstStyle/>
           <a:p>
             <a:r>
-              <a:rPr lang="en-US" smtClean="0"/>
+              <a:rPr lang="en-US"/>
               <a:t>Click to edit Master title style</a:t>
             </a:r>
-            <a:endParaRPr lang="en-US"/>
           </a:p>
         </p:txBody>
       </p:sp>
@@ -5816,38 +5768,37 @@
           <a:p>
             <a:pPr lvl="0"/>
             <a:r>
-              <a:rPr lang="en-US" smtClean="0"/>
+              <a:rPr lang="en-US"/>
               <a:t>Click to edit Master text styles</a:t>
             </a:r>
           </a:p>
           <a:p>
             <a:pPr lvl="1"/>
             <a:r>
-              <a:rPr lang="en-US" smtClean="0"/>
+              <a:rPr lang="en-US"/>
               <a:t>Second level</a:t>
             </a:r>
           </a:p>
           <a:p>
             <a:pPr lvl="2"/>
             <a:r>
-              <a:rPr lang="en-US" smtClean="0"/>
+              <a:rPr lang="en-US"/>
               <a:t>Third level</a:t>
             </a:r>
           </a:p>
           <a:p>
             <a:pPr lvl="3"/>
             <a:r>
-              <a:rPr lang="en-US" smtClean="0"/>
+              <a:rPr lang="en-US"/>
               <a:t>Fourth level</a:t>
             </a:r>
           </a:p>
           <a:p>
             <a:pPr lvl="4"/>
             <a:r>
-              <a:rPr lang="en-US" smtClean="0"/>
+              <a:rPr lang="en-US"/>
               <a:t>Fifth level</a:t>
             </a:r>
-            <a:endParaRPr lang="en-US"/>
           </a:p>
         </p:txBody>
       </p:sp>
@@ -5901,38 +5852,37 @@
           <a:p>
             <a:pPr lvl="0"/>
             <a:r>
-              <a:rPr lang="en-US" smtClean="0"/>
+              <a:rPr lang="en-US"/>
               <a:t>Click to edit Master text styles</a:t>
             </a:r>
           </a:p>
           <a:p>
             <a:pPr lvl="1"/>
             <a:r>
-              <a:rPr lang="en-US" smtClean="0"/>
+              <a:rPr lang="en-US"/>
               <a:t>Second level</a:t>
             </a:r>
           </a:p>
           <a:p>
             <a:pPr lvl="2"/>
             <a:r>
-              <a:rPr lang="en-US" smtClean="0"/>
+              <a:rPr lang="en-US"/>
               <a:t>Third level</a:t>
             </a:r>
           </a:p>
           <a:p>
             <a:pPr lvl="3"/>
             <a:r>
-              <a:rPr lang="en-US" smtClean="0"/>
+              <a:rPr lang="en-US"/>
               <a:t>Fourth level</a:t>
             </a:r>
           </a:p>
           <a:p>
             <a:pPr lvl="4"/>
             <a:r>
-              <a:rPr lang="en-US" smtClean="0"/>
+              <a:rPr lang="en-US"/>
               <a:t>Fifth level</a:t>
             </a:r>
-            <a:endParaRPr lang="en-US"/>
           </a:p>
         </p:txBody>
       </p:sp>
@@ -5953,7 +5903,7 @@
           <a:p>
             <a:fld id="{7B56D4AB-5359-46AF-BC0F-B3381E7AC84B}" type="datetimeFigureOut">
               <a:rPr lang="en-US" smtClean="0"/>
-              <a:t>5/16/2017</a:t>
+              <a:t>6/1/2017</a:t>
             </a:fld>
             <a:endParaRPr lang="en-US"/>
           </a:p>
@@ -6051,10 +6001,9 @@
           </a:lstStyle>
           <a:p>
             <a:r>
-              <a:rPr lang="en-US" smtClean="0"/>
+              <a:rPr lang="en-US"/>
               <a:t>Click to edit Master title style</a:t>
             </a:r>
-            <a:endParaRPr lang="en-US"/>
           </a:p>
         </p:txBody>
       </p:sp>
@@ -6117,7 +6066,7 @@
           <a:p>
             <a:pPr lvl="0"/>
             <a:r>
-              <a:rPr lang="en-US" smtClean="0"/>
+              <a:rPr lang="en-US"/>
               <a:t>Click to edit Master text styles</a:t>
             </a:r>
           </a:p>
@@ -6173,38 +6122,37 @@
           <a:p>
             <a:pPr lvl="0"/>
             <a:r>
-              <a:rPr lang="en-US" smtClean="0"/>
+              <a:rPr lang="en-US"/>
               <a:t>Click to edit Master text styles</a:t>
             </a:r>
           </a:p>
           <a:p>
             <a:pPr lvl="1"/>
             <a:r>
-              <a:rPr lang="en-US" smtClean="0"/>
+              <a:rPr lang="en-US"/>
               <a:t>Second level</a:t>
             </a:r>
           </a:p>
           <a:p>
             <a:pPr lvl="2"/>
             <a:r>
-              <a:rPr lang="en-US" smtClean="0"/>
+              <a:rPr lang="en-US"/>
               <a:t>Third level</a:t>
             </a:r>
           </a:p>
           <a:p>
             <a:pPr lvl="3"/>
             <a:r>
-              <a:rPr lang="en-US" smtClean="0"/>
+              <a:rPr lang="en-US"/>
               <a:t>Fourth level</a:t>
             </a:r>
           </a:p>
           <a:p>
             <a:pPr lvl="4"/>
             <a:r>
-              <a:rPr lang="en-US" smtClean="0"/>
+              <a:rPr lang="en-US"/>
               <a:t>Fifth level</a:t>
             </a:r>
-            <a:endParaRPr lang="en-US"/>
           </a:p>
         </p:txBody>
       </p:sp>
@@ -6267,7 +6215,7 @@
           <a:p>
             <a:pPr lvl="0"/>
             <a:r>
-              <a:rPr lang="en-US" smtClean="0"/>
+              <a:rPr lang="en-US"/>
               <a:t>Click to edit Master text styles</a:t>
             </a:r>
           </a:p>
@@ -6323,38 +6271,37 @@
           <a:p>
             <a:pPr lvl="0"/>
             <a:r>
-              <a:rPr lang="en-US" smtClean="0"/>
+              <a:rPr lang="en-US"/>
               <a:t>Click to edit Master text styles</a:t>
             </a:r>
           </a:p>
           <a:p>
             <a:pPr lvl="1"/>
             <a:r>
-              <a:rPr lang="en-US" smtClean="0"/>
+              <a:rPr lang="en-US"/>
               <a:t>Second level</a:t>
             </a:r>
           </a:p>
           <a:p>
             <a:pPr lvl="2"/>
             <a:r>
-              <a:rPr lang="en-US" smtClean="0"/>
+              <a:rPr lang="en-US"/>
               <a:t>Third level</a:t>
             </a:r>
           </a:p>
           <a:p>
             <a:pPr lvl="3"/>
             <a:r>
-              <a:rPr lang="en-US" smtClean="0"/>
+              <a:rPr lang="en-US"/>
               <a:t>Fourth level</a:t>
             </a:r>
           </a:p>
           <a:p>
             <a:pPr lvl="4"/>
             <a:r>
-              <a:rPr lang="en-US" smtClean="0"/>
+              <a:rPr lang="en-US"/>
               <a:t>Fifth level</a:t>
             </a:r>
-            <a:endParaRPr lang="en-US"/>
           </a:p>
         </p:txBody>
       </p:sp>
@@ -6375,7 +6322,7 @@
           <a:p>
             <a:fld id="{7B56D4AB-5359-46AF-BC0F-B3381E7AC84B}" type="datetimeFigureOut">
               <a:rPr lang="en-US" smtClean="0"/>
-              <a:t>5/16/2017</a:t>
+              <a:t>6/1/2017</a:t>
             </a:fld>
             <a:endParaRPr lang="en-US"/>
           </a:p>
@@ -6469,10 +6416,9 @@
           <a:lstStyle/>
           <a:p>
             <a:r>
-              <a:rPr lang="en-US" smtClean="0"/>
+              <a:rPr lang="en-US"/>
               <a:t>Click to edit Master title style</a:t>
             </a:r>
-            <a:endParaRPr lang="en-US"/>
           </a:p>
         </p:txBody>
       </p:sp>
@@ -6493,7 +6439,7 @@
           <a:p>
             <a:fld id="{7B56D4AB-5359-46AF-BC0F-B3381E7AC84B}" type="datetimeFigureOut">
               <a:rPr lang="en-US" smtClean="0"/>
-              <a:t>5/16/2017</a:t>
+              <a:t>6/1/2017</a:t>
             </a:fld>
             <a:endParaRPr lang="en-US"/>
           </a:p>
@@ -6588,7 +6534,7 @@
           <a:p>
             <a:fld id="{7B56D4AB-5359-46AF-BC0F-B3381E7AC84B}" type="datetimeFigureOut">
               <a:rPr lang="en-US" smtClean="0"/>
-              <a:t>5/16/2017</a:t>
+              <a:t>6/1/2017</a:t>
             </a:fld>
             <a:endParaRPr lang="en-US"/>
           </a:p>
@@ -6691,10 +6637,9 @@
           </a:lstStyle>
           <a:p>
             <a:r>
-              <a:rPr lang="en-US" smtClean="0"/>
+              <a:rPr lang="en-US"/>
               <a:t>Click to edit Master title style</a:t>
             </a:r>
-            <a:endParaRPr lang="en-US"/>
           </a:p>
         </p:txBody>
       </p:sp>
@@ -6748,38 +6693,37 @@
           <a:p>
             <a:pPr lvl="0"/>
             <a:r>
-              <a:rPr lang="en-US" smtClean="0"/>
+              <a:rPr lang="en-US"/>
               <a:t>Click to edit Master text styles</a:t>
             </a:r>
           </a:p>
           <a:p>
             <a:pPr lvl="1"/>
             <a:r>
-              <a:rPr lang="en-US" smtClean="0"/>
+              <a:rPr lang="en-US"/>
               <a:t>Second level</a:t>
             </a:r>
           </a:p>
           <a:p>
             <a:pPr lvl="2"/>
             <a:r>
-              <a:rPr lang="en-US" smtClean="0"/>
+              <a:rPr lang="en-US"/>
               <a:t>Third level</a:t>
             </a:r>
           </a:p>
           <a:p>
             <a:pPr lvl="3"/>
             <a:r>
-              <a:rPr lang="en-US" smtClean="0"/>
+              <a:rPr lang="en-US"/>
               <a:t>Fourth level</a:t>
             </a:r>
           </a:p>
           <a:p>
             <a:pPr lvl="4"/>
             <a:r>
-              <a:rPr lang="en-US" smtClean="0"/>
+              <a:rPr lang="en-US"/>
               <a:t>Fifth level</a:t>
             </a:r>
-            <a:endParaRPr lang="en-US"/>
           </a:p>
         </p:txBody>
       </p:sp>
@@ -6842,7 +6786,7 @@
           <a:p>
             <a:pPr lvl="0"/>
             <a:r>
-              <a:rPr lang="en-US" smtClean="0"/>
+              <a:rPr lang="en-US"/>
               <a:t>Click to edit Master text styles</a:t>
             </a:r>
           </a:p>
@@ -6865,7 +6809,7 @@
           <a:p>
             <a:fld id="{7B56D4AB-5359-46AF-BC0F-B3381E7AC84B}" type="datetimeFigureOut">
               <a:rPr lang="en-US" smtClean="0"/>
-              <a:t>5/16/2017</a:t>
+              <a:t>6/1/2017</a:t>
             </a:fld>
             <a:endParaRPr lang="en-US"/>
           </a:p>
@@ -6968,10 +6912,9 @@
           </a:lstStyle>
           <a:p>
             <a:r>
-              <a:rPr lang="en-US" smtClean="0"/>
+              <a:rPr lang="en-US"/>
               <a:t>Click to edit Master title style</a:t>
             </a:r>
-            <a:endParaRPr lang="en-US"/>
           </a:p>
         </p:txBody>
       </p:sp>
@@ -7095,7 +7038,7 @@
           <a:p>
             <a:pPr lvl="0"/>
             <a:r>
-              <a:rPr lang="en-US" smtClean="0"/>
+              <a:rPr lang="en-US"/>
               <a:t>Click to edit Master text styles</a:t>
             </a:r>
           </a:p>
@@ -7118,7 +7061,7 @@
           <a:p>
             <a:fld id="{7B56D4AB-5359-46AF-BC0F-B3381E7AC84B}" type="datetimeFigureOut">
               <a:rPr lang="en-US" smtClean="0"/>
-              <a:t>5/16/2017</a:t>
+              <a:t>6/1/2017</a:t>
             </a:fld>
             <a:endParaRPr lang="en-US"/>
           </a:p>
@@ -7227,10 +7170,9 @@
           <a:lstStyle/>
           <a:p>
             <a:r>
-              <a:rPr lang="en-US" smtClean="0"/>
+              <a:rPr lang="en-US"/>
               <a:t>Click to edit Master title style</a:t>
             </a:r>
-            <a:endParaRPr lang="en-US"/>
           </a:p>
         </p:txBody>
       </p:sp>
@@ -7261,38 +7203,37 @@
           <a:p>
             <a:pPr lvl="0"/>
             <a:r>
-              <a:rPr lang="en-US" smtClean="0"/>
+              <a:rPr lang="en-US"/>
               <a:t>Click to edit Master text styles</a:t>
             </a:r>
           </a:p>
           <a:p>
             <a:pPr lvl="1"/>
             <a:r>
-              <a:rPr lang="en-US" smtClean="0"/>
+              <a:rPr lang="en-US"/>
               <a:t>Second level</a:t>
             </a:r>
           </a:p>
           <a:p>
             <a:pPr lvl="2"/>
             <a:r>
-              <a:rPr lang="en-US" smtClean="0"/>
+              <a:rPr lang="en-US"/>
               <a:t>Third level</a:t>
             </a:r>
           </a:p>
           <a:p>
             <a:pPr lvl="3"/>
             <a:r>
-              <a:rPr lang="en-US" smtClean="0"/>
+              <a:rPr lang="en-US"/>
               <a:t>Fourth level</a:t>
             </a:r>
           </a:p>
           <a:p>
             <a:pPr lvl="4"/>
             <a:r>
-              <a:rPr lang="en-US" smtClean="0"/>
+              <a:rPr lang="en-US"/>
               <a:t>Fifth level</a:t>
             </a:r>
-            <a:endParaRPr lang="en-US"/>
           </a:p>
         </p:txBody>
       </p:sp>
@@ -7331,7 +7272,7 @@
           <a:p>
             <a:fld id="{7B56D4AB-5359-46AF-BC0F-B3381E7AC84B}" type="datetimeFigureOut">
               <a:rPr lang="en-US" smtClean="0"/>
-              <a:t>5/16/2017</a:t>
+              <a:t>6/1/2017</a:t>
             </a:fld>
             <a:endParaRPr lang="en-US"/>
           </a:p>
@@ -7706,6 +7647,106 @@
           <a:chExt cx="0" cy="0"/>
         </a:xfrm>
       </p:grpSpPr>
+      <p:sp>
+        <p:nvSpPr>
+          <p:cNvPr id="2" name="Rectangle: Rounded Corners 1"/>
+          <p:cNvSpPr/>
+          <p:nvPr/>
+        </p:nvSpPr>
+        <p:spPr>
+          <a:xfrm>
+            <a:off x="6781800" y="3657600"/>
+            <a:ext cx="2133600" cy="2286000"/>
+          </a:xfrm>
+          <a:prstGeom prst="roundRect">
+            <a:avLst/>
+          </a:prstGeom>
+          <a:solidFill>
+            <a:schemeClr val="accent1">
+              <a:alpha val="22000"/>
+            </a:schemeClr>
+          </a:solidFill>
+        </p:spPr>
+        <p:style>
+          <a:lnRef idx="2">
+            <a:schemeClr val="accent1">
+              <a:shade val="50000"/>
+            </a:schemeClr>
+          </a:lnRef>
+          <a:fillRef idx="1">
+            <a:schemeClr val="accent1"/>
+          </a:fillRef>
+          <a:effectRef idx="0">
+            <a:schemeClr val="accent1"/>
+          </a:effectRef>
+          <a:fontRef idx="minor">
+            <a:schemeClr val="lt1"/>
+          </a:fontRef>
+        </p:style>
+        <p:txBody>
+          <a:bodyPr rtlCol="0" anchor="ctr"/>
+          <a:lstStyle/>
+          <a:p>
+            <a:pPr algn="ctr"/>
+            <a:r>
+              <a:rPr lang="en-US" dirty="0">
+                <a:solidFill>
+                  <a:schemeClr val="tx2"/>
+                </a:solidFill>
+              </a:rPr>
+              <a:t>Hosted Applications</a:t>
+            </a:r>
+          </a:p>
+          <a:p>
+            <a:pPr algn="ctr"/>
+            <a:endParaRPr lang="en-US" dirty="0">
+              <a:solidFill>
+                <a:schemeClr val="tx2"/>
+              </a:solidFill>
+            </a:endParaRPr>
+          </a:p>
+          <a:p>
+            <a:pPr algn="ctr"/>
+            <a:endParaRPr lang="en-US" dirty="0">
+              <a:solidFill>
+                <a:schemeClr val="tx2"/>
+              </a:solidFill>
+            </a:endParaRPr>
+          </a:p>
+          <a:p>
+            <a:pPr algn="ctr"/>
+            <a:endParaRPr lang="en-US" dirty="0">
+              <a:solidFill>
+                <a:schemeClr val="tx2"/>
+              </a:solidFill>
+            </a:endParaRPr>
+          </a:p>
+          <a:p>
+            <a:pPr algn="ctr"/>
+            <a:endParaRPr lang="en-US" dirty="0">
+              <a:solidFill>
+                <a:schemeClr val="tx2"/>
+              </a:solidFill>
+            </a:endParaRPr>
+          </a:p>
+          <a:p>
+            <a:pPr algn="ctr"/>
+            <a:endParaRPr lang="en-US" dirty="0">
+              <a:solidFill>
+                <a:schemeClr val="tx2"/>
+              </a:solidFill>
+            </a:endParaRPr>
+          </a:p>
+          <a:p>
+            <a:pPr algn="ctr"/>
+            <a:endParaRPr lang="en-US" dirty="0">
+              <a:solidFill>
+                <a:schemeClr val="tx2"/>
+              </a:solidFill>
+            </a:endParaRPr>
+          </a:p>
+        </p:txBody>
+      </p:sp>
       <p:graphicFrame>
         <p:nvGraphicFramePr>
           <p:cNvPr id="4" name="Content Placeholder 3"/>
@@ -7716,7 +7757,7 @@
             <p:ph idx="1"/>
             <p:extLst>
               <p:ext uri="{D42A27DB-BD31-4B8C-83A1-F6EECF244321}">
-                <p14:modId xmlns:p14="http://schemas.microsoft.com/office/powerpoint/2010/main" val="417957564"/>
+                <p14:modId xmlns:p14="http://schemas.microsoft.com/office/powerpoint/2010/main" val="2125609225"/>
               </p:ext>
             </p:extLst>
           </p:nvPr>
@@ -7741,13 +7782,6 @@
   <p:clrMapOvr>
     <a:masterClrMapping/>
   </p:clrMapOvr>
-  <p:timing>
-    <p:tnLst>
-      <p:par>
-        <p:cTn id="1" dur="indefinite" restart="never" nodeType="tmRoot"/>
-      </p:par>
-    </p:tnLst>
-  </p:timing>
 </p:sld>
 </file>
 

</xml_diff>